<commit_message>
This version includes commented out code with various attempts to reconcile the relative and absolute change in DOFS as the resolution of the MSG changes.
</commit_message>
<xml_diff>
--- a/plots/multiplot_figures.pptx
+++ b/plots/multiplot_figures.pptx
@@ -5328,10 +5328,10 @@
       </p:grpSpPr>
       <p:grpSp>
         <p:nvGrpSpPr>
-          <p:cNvPr id="4" name="Group 3">
-            <a:extLst>
-              <a:ext uri="{FF2B5EF4-FFF2-40B4-BE49-F238E27FC236}">
-                <a16:creationId xmlns:a16="http://schemas.microsoft.com/office/drawing/2014/main" id="{B765CCEC-50F5-8744-9C94-37869BD8518D}"/>
+          <p:cNvPr id="20" name="Group 19">
+            <a:extLst>
+              <a:ext uri="{FF2B5EF4-FFF2-40B4-BE49-F238E27FC236}">
+                <a16:creationId xmlns:a16="http://schemas.microsoft.com/office/drawing/2014/main" id="{6453EC05-17BB-EF42-A9CC-7C6EE31C2FB0}"/>
               </a:ext>
             </a:extLst>
           </p:cNvPr>
@@ -5340,18 +5340,48 @@
         </p:nvGrpSpPr>
         <p:grpSpPr>
           <a:xfrm>
-            <a:off x="0" y="1225914"/>
-            <a:ext cx="12192000" cy="4545785"/>
-            <a:chOff x="0" y="1225914"/>
-            <a:chExt cx="12192000" cy="4545785"/>
+            <a:off x="0" y="956110"/>
+            <a:ext cx="12192000" cy="4945779"/>
+            <a:chOff x="0" y="675968"/>
+            <a:chExt cx="12192000" cy="4945779"/>
           </a:xfrm>
         </p:grpSpPr>
         <p:pic>
           <p:nvPicPr>
-            <p:cNvPr id="3" name="Picture 2" descr="A close up of a map&#10;&#10;Description automatically generated">
+            <p:cNvPr id="17" name="Picture 16" descr="A close up of a map&#10;&#10;Description automatically generated">
               <a:extLst>
                 <a:ext uri="{FF2B5EF4-FFF2-40B4-BE49-F238E27FC236}">
-                  <a16:creationId xmlns:a16="http://schemas.microsoft.com/office/drawing/2014/main" id="{A893A815-564B-E046-90B3-AD71E3058610}"/>
+                  <a16:creationId xmlns:a16="http://schemas.microsoft.com/office/drawing/2014/main" id="{1088701B-CC0E-0D47-A001-99ADADE4A55A}"/>
+                </a:ext>
+              </a:extLst>
+            </p:cNvPr>
+            <p:cNvPicPr>
+              <a:picLocks noChangeAspect="1"/>
+            </p:cNvPicPr>
+            <p:nvPr/>
+          </p:nvPicPr>
+          <p:blipFill>
+            <a:blip r:embed="rId2"/>
+            <a:stretch>
+              <a:fillRect/>
+            </a:stretch>
+          </p:blipFill>
+          <p:spPr>
+            <a:xfrm>
+              <a:off x="0" y="675968"/>
+              <a:ext cx="12192000" cy="2753032"/>
+            </a:xfrm>
+            <a:prstGeom prst="rect">
+              <a:avLst/>
+            </a:prstGeom>
+          </p:spPr>
+        </p:pic>
+        <p:pic>
+          <p:nvPicPr>
+            <p:cNvPr id="19" name="Picture 18" descr="A close up of a map&#10;&#10;Description automatically generated">
+              <a:extLst>
+                <a:ext uri="{FF2B5EF4-FFF2-40B4-BE49-F238E27FC236}">
+                  <a16:creationId xmlns:a16="http://schemas.microsoft.com/office/drawing/2014/main" id="{2736CA46-A93A-E74A-8CD9-085227559EC2}"/>
                 </a:ext>
               </a:extLst>
             </p:cNvPr>
@@ -5361,44 +5391,14 @@
             <p:nvPr/>
           </p:nvPicPr>
           <p:blipFill rotWithShape="1">
-            <a:blip r:embed="rId2"/>
-            <a:srcRect t="22677"/>
+            <a:blip r:embed="rId3"/>
+            <a:srcRect t="21941" b="1"/>
             <a:stretch/>
           </p:blipFill>
           <p:spPr>
             <a:xfrm>
-              <a:off x="0" y="3790438"/>
-              <a:ext cx="12192000" cy="1981261"/>
-            </a:xfrm>
-            <a:prstGeom prst="rect">
-              <a:avLst/>
-            </a:prstGeom>
-          </p:spPr>
-        </p:pic>
-        <p:pic>
-          <p:nvPicPr>
-            <p:cNvPr id="5" name="Picture 4">
-              <a:extLst>
-                <a:ext uri="{FF2B5EF4-FFF2-40B4-BE49-F238E27FC236}">
-                  <a16:creationId xmlns:a16="http://schemas.microsoft.com/office/drawing/2014/main" id="{F3069294-2B09-E64C-BCA5-5D0900190923}"/>
-                </a:ext>
-              </a:extLst>
-            </p:cNvPr>
-            <p:cNvPicPr>
-              <a:picLocks noChangeAspect="1"/>
-            </p:cNvPicPr>
-            <p:nvPr/>
-          </p:nvPicPr>
-          <p:blipFill>
-            <a:blip r:embed="rId3"/>
-            <a:stretch>
-              <a:fillRect/>
-            </a:stretch>
-          </p:blipFill>
-          <p:spPr>
-            <a:xfrm>
-              <a:off x="0" y="1225914"/>
-              <a:ext cx="12192000" cy="2564524"/>
+              <a:off x="0" y="3598985"/>
+              <a:ext cx="12192000" cy="2022762"/>
             </a:xfrm>
             <a:prstGeom prst="rect">
               <a:avLst/>

</xml_diff>